<commit_message>
Avances tercera semana de marzo. Inclusión de clases, pruebas con tags, creación de condicionales en sub rutinas
</commit_message>
<xml_diff>
--- a/Código/Material Hugo/Comunicación Xbee.pptx
+++ b/Código/Material Hugo/Comunicación Xbee.pptx
@@ -275,7 +275,7 @@
           <a:p>
             <a:fld id="{07940F4C-7307-48AA-A8D9-89A057B45648}" type="datetimeFigureOut">
               <a:rPr lang="es-CO" smtClean="0"/>
-              <a:t>9/02/2022</a:t>
+              <a:t>18/03/2022</a:t>
             </a:fld>
             <a:endParaRPr lang="es-CO"/>
           </a:p>
@@ -475,7 +475,7 @@
           <a:p>
             <a:fld id="{07940F4C-7307-48AA-A8D9-89A057B45648}" type="datetimeFigureOut">
               <a:rPr lang="es-CO" smtClean="0"/>
-              <a:t>9/02/2022</a:t>
+              <a:t>18/03/2022</a:t>
             </a:fld>
             <a:endParaRPr lang="es-CO"/>
           </a:p>
@@ -685,7 +685,7 @@
           <a:p>
             <a:fld id="{07940F4C-7307-48AA-A8D9-89A057B45648}" type="datetimeFigureOut">
               <a:rPr lang="es-CO" smtClean="0"/>
-              <a:t>9/02/2022</a:t>
+              <a:t>18/03/2022</a:t>
             </a:fld>
             <a:endParaRPr lang="es-CO"/>
           </a:p>
@@ -885,7 +885,7 @@
           <a:p>
             <a:fld id="{07940F4C-7307-48AA-A8D9-89A057B45648}" type="datetimeFigureOut">
               <a:rPr lang="es-CO" smtClean="0"/>
-              <a:t>9/02/2022</a:t>
+              <a:t>18/03/2022</a:t>
             </a:fld>
             <a:endParaRPr lang="es-CO"/>
           </a:p>
@@ -1161,7 +1161,7 @@
           <a:p>
             <a:fld id="{07940F4C-7307-48AA-A8D9-89A057B45648}" type="datetimeFigureOut">
               <a:rPr lang="es-CO" smtClean="0"/>
-              <a:t>9/02/2022</a:t>
+              <a:t>18/03/2022</a:t>
             </a:fld>
             <a:endParaRPr lang="es-CO"/>
           </a:p>
@@ -1429,7 +1429,7 @@
           <a:p>
             <a:fld id="{07940F4C-7307-48AA-A8D9-89A057B45648}" type="datetimeFigureOut">
               <a:rPr lang="es-CO" smtClean="0"/>
-              <a:t>9/02/2022</a:t>
+              <a:t>18/03/2022</a:t>
             </a:fld>
             <a:endParaRPr lang="es-CO"/>
           </a:p>
@@ -1844,7 +1844,7 @@
           <a:p>
             <a:fld id="{07940F4C-7307-48AA-A8D9-89A057B45648}" type="datetimeFigureOut">
               <a:rPr lang="es-CO" smtClean="0"/>
-              <a:t>9/02/2022</a:t>
+              <a:t>18/03/2022</a:t>
             </a:fld>
             <a:endParaRPr lang="es-CO"/>
           </a:p>
@@ -1986,7 +1986,7 @@
           <a:p>
             <a:fld id="{07940F4C-7307-48AA-A8D9-89A057B45648}" type="datetimeFigureOut">
               <a:rPr lang="es-CO" smtClean="0"/>
-              <a:t>9/02/2022</a:t>
+              <a:t>18/03/2022</a:t>
             </a:fld>
             <a:endParaRPr lang="es-CO"/>
           </a:p>
@@ -2099,7 +2099,7 @@
           <a:p>
             <a:fld id="{07940F4C-7307-48AA-A8D9-89A057B45648}" type="datetimeFigureOut">
               <a:rPr lang="es-CO" smtClean="0"/>
-              <a:t>9/02/2022</a:t>
+              <a:t>18/03/2022</a:t>
             </a:fld>
             <a:endParaRPr lang="es-CO"/>
           </a:p>
@@ -2412,7 +2412,7 @@
           <a:p>
             <a:fld id="{07940F4C-7307-48AA-A8D9-89A057B45648}" type="datetimeFigureOut">
               <a:rPr lang="es-CO" smtClean="0"/>
-              <a:t>9/02/2022</a:t>
+              <a:t>18/03/2022</a:t>
             </a:fld>
             <a:endParaRPr lang="es-CO"/>
           </a:p>
@@ -2701,7 +2701,7 @@
           <a:p>
             <a:fld id="{07940F4C-7307-48AA-A8D9-89A057B45648}" type="datetimeFigureOut">
               <a:rPr lang="es-CO" smtClean="0"/>
-              <a:t>9/02/2022</a:t>
+              <a:t>18/03/2022</a:t>
             </a:fld>
             <a:endParaRPr lang="es-CO"/>
           </a:p>
@@ -2944,7 +2944,7 @@
           <a:p>
             <a:fld id="{07940F4C-7307-48AA-A8D9-89A057B45648}" type="datetimeFigureOut">
               <a:rPr lang="es-CO" smtClean="0"/>
-              <a:t>9/02/2022</a:t>
+              <a:t>18/03/2022</a:t>
             </a:fld>
             <a:endParaRPr lang="es-CO"/>
           </a:p>
@@ -7284,30 +7284,54 @@
           </a:extLst>
         </p:spPr>
       </p:pic>
+      <p:sp>
+        <p:nvSpPr>
+          <p:cNvPr id="6" name="Marcador de contenido 5">
+            <a:extLst>
+              <a:ext uri="{FF2B5EF4-FFF2-40B4-BE49-F238E27FC236}">
+                <a16:creationId xmlns:a16="http://schemas.microsoft.com/office/drawing/2014/main" id="{A85FF82F-3360-44FD-8888-5705F7110750}"/>
+              </a:ext>
+            </a:extLst>
+          </p:cNvPr>
+          <p:cNvSpPr>
+            <a:spLocks noGrp="1"/>
+          </p:cNvSpPr>
+          <p:nvPr>
+            <p:ph idx="1"/>
+          </p:nvPr>
+        </p:nvSpPr>
+        <p:spPr/>
+        <p:txBody>
+          <a:bodyPr/>
+          <a:lstStyle/>
+          <a:p>
+            <a:endParaRPr lang="en-US"/>
+          </a:p>
+        </p:txBody>
+      </p:sp>
       <p:graphicFrame>
         <p:nvGraphicFramePr>
-          <p:cNvPr id="5" name="Marcador de contenido 4">
-            <a:extLst>
-              <a:ext uri="{FF2B5EF4-FFF2-40B4-BE49-F238E27FC236}">
-                <a16:creationId xmlns:a16="http://schemas.microsoft.com/office/drawing/2014/main" id="{F9BDE65A-D9EF-47EA-A69F-470E59B1A9AC}"/>
+          <p:cNvPr id="11" name="Marcador de contenido 4">
+            <a:extLst>
+              <a:ext uri="{FF2B5EF4-FFF2-40B4-BE49-F238E27FC236}">
+                <a16:creationId xmlns:a16="http://schemas.microsoft.com/office/drawing/2014/main" id="{61DDDDEE-C02F-475F-A69E-7C8AEEF28E14}"/>
               </a:ext>
             </a:extLst>
           </p:cNvPr>
           <p:cNvGraphicFramePr>
-            <a:graphicFrameLocks noGrp="1"/>
+            <a:graphicFrameLocks/>
           </p:cNvGraphicFramePr>
           <p:nvPr>
-            <p:ph idx="1"/>
             <p:extLst>
               <p:ext uri="{D42A27DB-BD31-4B8C-83A1-F6EECF244321}">
-                <p14:modId xmlns:p14="http://schemas.microsoft.com/office/powerpoint/2010/main" val="2075573921"/>
+                <p14:modId xmlns:p14="http://schemas.microsoft.com/office/powerpoint/2010/main" val="1388026044"/>
               </p:ext>
             </p:extLst>
           </p:nvPr>
         </p:nvGraphicFramePr>
         <p:xfrm>
-          <a:off x="1432415" y="482605"/>
-          <a:ext cx="5265334" cy="5211910"/>
+          <a:off x="1659045" y="350334"/>
+          <a:ext cx="5265334" cy="5685720"/>
         </p:xfrm>
         <a:graphic>
           <a:graphicData uri="http://schemas.openxmlformats.org/drawingml/2006/table">
@@ -7424,12 +7448,12 @@
                     <a:p>
                       <a:pPr algn="ctr" fontAlgn="ctr"/>
                       <a:r>
-                        <a:rPr lang="es-CO" sz="2000" u="none" strike="noStrike">
+                        <a:rPr lang="es-CO" sz="2000" u="none" strike="noStrike" dirty="0">
                           <a:effectLst/>
                         </a:rPr>
-                        <a:t>1</a:t>
+                        <a:t>Coordinador</a:t>
                       </a:r>
-                      <a:endParaRPr lang="es-CO" sz="2000" b="0" i="0" u="none" strike="noStrike">
+                      <a:endParaRPr lang="es-CO" sz="2000" b="0" i="0" u="none" strike="noStrike" dirty="0">
                         <a:solidFill>
                           <a:srgbClr val="000000"/>
                         </a:solidFill>
@@ -7454,12 +7478,12 @@
                     <a:p>
                       <a:pPr algn="ctr" fontAlgn="ctr"/>
                       <a:r>
-                        <a:rPr lang="es-CO" sz="2000" u="none" strike="noStrike">
+                        <a:rPr lang="es-CO" sz="2000" u="none" strike="noStrike" dirty="0">
                           <a:effectLst/>
                         </a:rPr>
-                        <a:t>41 7F C5 8B</a:t>
+                        <a:t>41078991</a:t>
                       </a:r>
-                      <a:endParaRPr lang="es-CO" sz="2000" b="0" i="0" u="none" strike="noStrike">
+                      <a:endParaRPr lang="es-CO" sz="2000" b="0" i="0" u="none" strike="noStrike" dirty="0">
                         <a:solidFill>
                           <a:srgbClr val="000000"/>
                         </a:solidFill>
@@ -7480,6 +7504,73 @@
                 <a:extLst>
                   <a:ext uri="{0D108BD9-81ED-4DB2-BD59-A6C34878D82A}">
                     <a16:rowId xmlns:a16="http://schemas.microsoft.com/office/drawing/2014/main" val="1759555046"/>
+                  </a:ext>
+                </a:extLst>
+              </a:tr>
+              <a:tr h="473810">
+                <a:tc>
+                  <a:txBody>
+                    <a:bodyPr/>
+                    <a:lstStyle/>
+                    <a:p>
+                      <a:pPr algn="ctr" fontAlgn="ctr"/>
+                      <a:r>
+                        <a:rPr lang="es-CO" sz="2000" u="none" strike="noStrike" dirty="0">
+                          <a:effectLst/>
+                        </a:rPr>
+                        <a:t>1</a:t>
+                      </a:r>
+                      <a:endParaRPr lang="es-CO" sz="2000" b="0" i="0" u="none" strike="noStrike" dirty="0">
+                        <a:solidFill>
+                          <a:srgbClr val="000000"/>
+                        </a:solidFill>
+                        <a:effectLst/>
+                        <a:latin typeface="Calibri" panose="020F0502020204030204" pitchFamily="34" charset="0"/>
+                      </a:endParaRPr>
+                    </a:p>
+                  </a:txBody>
+                  <a:tcPr marL="17044" marR="17044" marT="17044" marB="0" anchor="ctr">
+                    <a:solidFill>
+                      <a:schemeClr val="accent5">
+                        <a:lumMod val="20000"/>
+                        <a:lumOff val="80000"/>
+                      </a:schemeClr>
+                    </a:solidFill>
+                  </a:tcPr>
+                </a:tc>
+                <a:tc>
+                  <a:txBody>
+                    <a:bodyPr/>
+                    <a:lstStyle/>
+                    <a:p>
+                      <a:pPr algn="ctr" fontAlgn="ctr"/>
+                      <a:r>
+                        <a:rPr lang="es-CO" sz="2000" u="none" strike="noStrike" dirty="0">
+                          <a:effectLst/>
+                        </a:rPr>
+                        <a:t>417FC58B</a:t>
+                      </a:r>
+                      <a:endParaRPr lang="es-CO" sz="2000" b="0" i="0" u="none" strike="noStrike" dirty="0">
+                        <a:solidFill>
+                          <a:srgbClr val="000000"/>
+                        </a:solidFill>
+                        <a:effectLst/>
+                        <a:latin typeface="Calibri" panose="020F0502020204030204" pitchFamily="34" charset="0"/>
+                      </a:endParaRPr>
+                    </a:p>
+                  </a:txBody>
+                  <a:tcPr marL="17044" marR="17044" marT="17044" marB="0" anchor="ctr">
+                    <a:solidFill>
+                      <a:schemeClr val="accent5">
+                        <a:lumMod val="20000"/>
+                        <a:lumOff val="80000"/>
+                      </a:schemeClr>
+                    </a:solidFill>
+                  </a:tcPr>
+                </a:tc>
+                <a:extLst>
+                  <a:ext uri="{0D108BD9-81ED-4DB2-BD59-A6C34878D82A}">
+                    <a16:rowId xmlns:a16="http://schemas.microsoft.com/office/drawing/2014/main" val="598188219"/>
                   </a:ext>
                 </a:extLst>
               </a:tr>
@@ -7521,12 +7612,12 @@
                     <a:p>
                       <a:pPr algn="ctr" fontAlgn="ctr"/>
                       <a:r>
-                        <a:rPr lang="es-CO" sz="2000" u="none" strike="noStrike">
+                        <a:rPr lang="es-CO" sz="2000" u="none" strike="noStrike" dirty="0">
                           <a:effectLst/>
                         </a:rPr>
-                        <a:t>41 72 C7 5C</a:t>
+                        <a:t>4172C75C</a:t>
                       </a:r>
-                      <a:endParaRPr lang="es-CO" sz="2000" b="0" i="0" u="none" strike="noStrike">
+                      <a:endParaRPr lang="es-CO" sz="2000" b="0" i="0" u="none" strike="noStrike" dirty="0">
                         <a:solidFill>
                           <a:srgbClr val="000000"/>
                         </a:solidFill>
@@ -7588,12 +7679,12 @@
                     <a:p>
                       <a:pPr algn="ctr" fontAlgn="ctr"/>
                       <a:r>
-                        <a:rPr lang="es-CO" sz="2000" u="none" strike="noStrike">
+                        <a:rPr lang="es-CO" sz="2000" u="none" strike="noStrike" dirty="0">
                           <a:effectLst/>
                         </a:rPr>
-                        <a:t>41 8C BA 6C</a:t>
+                        <a:t>418CBA6C</a:t>
                       </a:r>
-                      <a:endParaRPr lang="es-CO" sz="2000" b="0" i="0" u="none" strike="noStrike">
+                      <a:endParaRPr lang="es-CO" sz="2000" b="0" i="0" u="none" strike="noStrike" dirty="0">
                         <a:solidFill>
                           <a:srgbClr val="000000"/>
                         </a:solidFill>
@@ -7655,12 +7746,12 @@
                     <a:p>
                       <a:pPr algn="ctr" fontAlgn="ctr"/>
                       <a:r>
-                        <a:rPr lang="es-CO" sz="2000" u="none" strike="noStrike">
+                        <a:rPr lang="es-CO" sz="2000" u="none" strike="noStrike" dirty="0">
                           <a:effectLst/>
                         </a:rPr>
-                        <a:t>41 07 89 8C</a:t>
+                        <a:t>4107898C</a:t>
                       </a:r>
-                      <a:endParaRPr lang="es-CO" sz="2000" b="0" i="0" u="none" strike="noStrike">
+                      <a:endParaRPr lang="es-CO" sz="2000" b="0" i="0" u="none" strike="noStrike" dirty="0">
                         <a:solidFill>
                           <a:srgbClr val="000000"/>
                         </a:solidFill>
@@ -7722,12 +7813,12 @@
                     <a:p>
                       <a:pPr algn="ctr" fontAlgn="ctr"/>
                       <a:r>
-                        <a:rPr lang="es-CO" sz="2000" u="none" strike="noStrike">
+                        <a:rPr lang="es-CO" sz="2000" u="none" strike="noStrike" dirty="0">
                           <a:effectLst/>
                         </a:rPr>
-                        <a:t>41 89 40 79</a:t>
+                        <a:t>41894079</a:t>
                       </a:r>
-                      <a:endParaRPr lang="es-CO" sz="2000" b="0" i="0" u="none" strike="noStrike">
+                      <a:endParaRPr lang="es-CO" sz="2000" b="0" i="0" u="none" strike="noStrike" dirty="0">
                         <a:solidFill>
                           <a:srgbClr val="000000"/>
                         </a:solidFill>
@@ -7789,12 +7880,12 @@
                     <a:p>
                       <a:pPr algn="ctr" fontAlgn="ctr"/>
                       <a:r>
-                        <a:rPr lang="es-CO" sz="2000" u="none" strike="noStrike">
+                        <a:rPr lang="es-CO" sz="2000" u="none" strike="noStrike" dirty="0">
                           <a:effectLst/>
                         </a:rPr>
-                        <a:t>40 AB DD AA</a:t>
+                        <a:t>40ABDDAA</a:t>
                       </a:r>
-                      <a:endParaRPr lang="es-CO" sz="2000" b="0" i="0" u="none" strike="noStrike">
+                      <a:endParaRPr lang="es-CO" sz="2000" b="0" i="0" u="none" strike="noStrike" dirty="0">
                         <a:solidFill>
                           <a:srgbClr val="000000"/>
                         </a:solidFill>
@@ -7859,7 +7950,7 @@
                         <a:rPr lang="es-CO" sz="2000" u="none" strike="noStrike" dirty="0">
                           <a:effectLst/>
                         </a:rPr>
-                        <a:t>41 72 C7 5A</a:t>
+                        <a:t>4172C75A</a:t>
                       </a:r>
                       <a:endParaRPr lang="es-CO" sz="2000" b="0" i="0" u="none" strike="noStrike" dirty="0">
                         <a:solidFill>
@@ -7923,12 +8014,12 @@
                     <a:p>
                       <a:pPr algn="ctr" fontAlgn="ctr"/>
                       <a:r>
-                        <a:rPr lang="es-CO" sz="2000" u="none" strike="noStrike">
+                        <a:rPr lang="es-CO" sz="2000" u="none" strike="noStrike" dirty="0">
                           <a:effectLst/>
                         </a:rPr>
-                        <a:t>41 07 89 8E</a:t>
+                        <a:t>41894067</a:t>
                       </a:r>
-                      <a:endParaRPr lang="es-CO" sz="2000" b="0" i="0" u="none" strike="noStrike">
+                      <a:endParaRPr lang="es-CO" sz="2000" b="0" i="0" u="none" strike="noStrike" dirty="0">
                         <a:solidFill>
                           <a:srgbClr val="000000"/>
                         </a:solidFill>
@@ -7990,12 +8081,12 @@
                     <a:p>
                       <a:pPr algn="ctr" fontAlgn="ctr"/>
                       <a:r>
-                        <a:rPr lang="es-CO" sz="2000" u="none" strike="noStrike">
+                        <a:rPr lang="es-CO" sz="2000" u="none" strike="noStrike" dirty="0">
                           <a:effectLst/>
                         </a:rPr>
-                        <a:t>40 B5 EA 4C</a:t>
+                        <a:t>40B5E93A</a:t>
                       </a:r>
-                      <a:endParaRPr lang="es-CO" sz="2000" b="0" i="0" u="none" strike="noStrike">
+                      <a:endParaRPr lang="es-CO" sz="2000" b="0" i="0" u="none" strike="noStrike" dirty="0">
                         <a:solidFill>
                           <a:srgbClr val="000000"/>
                         </a:solidFill>
@@ -8060,7 +8151,7 @@
                         <a:rPr lang="es-CO" sz="2000" u="none" strike="noStrike" dirty="0">
                           <a:effectLst/>
                         </a:rPr>
-                        <a:t>40 BA 97 5B</a:t>
+                        <a:t>40BA975B</a:t>
                       </a:r>
                       <a:endParaRPr lang="es-CO" sz="2000" b="0" i="0" u="none" strike="noStrike" dirty="0">
                         <a:solidFill>

</xml_diff>